<commit_message>
Modification to include backward integrity in slides
</commit_message>
<xml_diff>
--- a/ex/552-F19/lectures/13-transport-security.pptx
+++ b/ex/552-F19/lectures/13-transport-security.pptx
@@ -766,7 +766,7 @@
           <a:noFill/>
           <a:extLst>
             <a:ext uri="{FAA26D3D-D897-4be2-8F04-BA451C77F1D7}">
-              <ma14:placeholderFlag xmlns:ma14="http://schemas.microsoft.com/office/mac/drawingml/2011/main" xmlns="" val="1"/>
+              <ma14:placeholderFlag xmlns="" xmlns:ma14="http://schemas.microsoft.com/office/mac/drawingml/2011/main" val="1"/>
             </a:ext>
           </a:extLst>
         </p:spPr>
@@ -784,6 +784,93 @@
     <p:extLst>
       <p:ext uri="{BB962C8B-B14F-4D97-AF65-F5344CB8AC3E}">
         <p14:creationId xmlns:p14="http://schemas.microsoft.com/office/powerpoint/2010/main" val="3635464736"/>
+      </p:ext>
+    </p:extLst>
+  </p:cSld>
+  <p:clrMapOvr>
+    <a:masterClrMapping/>
+  </p:clrMapOvr>
+</p:notes>
+</file>
+
+<file path=ppt/notesSlides/notesSlide3.xml><?xml version="1.0" encoding="utf-8"?>
+<p:notes xmlns:a="http://schemas.openxmlformats.org/drawingml/2006/main" xmlns:r="http://schemas.openxmlformats.org/officeDocument/2006/relationships" xmlns:p="http://schemas.openxmlformats.org/presentationml/2006/main">
+  <p:cSld>
+    <p:spTree>
+      <p:nvGrpSpPr>
+        <p:cNvPr id="1" name=""/>
+        <p:cNvGrpSpPr/>
+        <p:nvPr/>
+      </p:nvGrpSpPr>
+      <p:grpSpPr>
+        <a:xfrm>
+          <a:off x="0" y="0"/>
+          <a:ext cx="0" cy="0"/>
+          <a:chOff x="0" y="0"/>
+          <a:chExt cx="0" cy="0"/>
+        </a:xfrm>
+      </p:grpSpPr>
+      <p:sp>
+        <p:nvSpPr>
+          <p:cNvPr id="2" name="Slide Image Placeholder 1"/>
+          <p:cNvSpPr>
+            <a:spLocks noGrp="1" noRot="1" noChangeAspect="1"/>
+          </p:cNvSpPr>
+          <p:nvPr>
+            <p:ph type="sldImg"/>
+          </p:nvPr>
+        </p:nvSpPr>
+        <p:spPr/>
+      </p:sp>
+      <p:sp>
+        <p:nvSpPr>
+          <p:cNvPr id="3" name="Notes Placeholder 2"/>
+          <p:cNvSpPr>
+            <a:spLocks noGrp="1"/>
+          </p:cNvSpPr>
+          <p:nvPr>
+            <p:ph type="body" idx="1"/>
+          </p:nvPr>
+        </p:nvSpPr>
+        <p:spPr/>
+        <p:txBody>
+          <a:bodyPr/>
+          <a:lstStyle/>
+          <a:p>
+            <a:r>
+              <a:rPr lang="en-US" dirty="0"/>
+              <a:t>Thanks to Jakob Degen for suggesting the term backward integrity in class. I’m not sure if there is a term of art for this property and what that is.</a:t>
+            </a:r>
+          </a:p>
+        </p:txBody>
+      </p:sp>
+      <p:sp>
+        <p:nvSpPr>
+          <p:cNvPr id="4" name="Slide Number Placeholder 3"/>
+          <p:cNvSpPr>
+            <a:spLocks noGrp="1"/>
+          </p:cNvSpPr>
+          <p:nvPr>
+            <p:ph type="sldNum" sz="quarter" idx="5"/>
+          </p:nvPr>
+        </p:nvSpPr>
+        <p:spPr/>
+        <p:txBody>
+          <a:bodyPr/>
+          <a:lstStyle/>
+          <a:p>
+            <a:fld id="{374CFC95-A4B1-B94A-8100-0CEEF7FB338C}" type="slidenum">
+              <a:rPr lang="en-US" smtClean="0"/>
+              <a:t>24</a:t>
+            </a:fld>
+            <a:endParaRPr lang="en-US"/>
+          </a:p>
+        </p:txBody>
+      </p:sp>
+    </p:spTree>
+    <p:extLst>
+      <p:ext uri="{BB962C8B-B14F-4D97-AF65-F5344CB8AC3E}">
+        <p14:creationId xmlns:p14="http://schemas.microsoft.com/office/powerpoint/2010/main" val="2143842559"/>
       </p:ext>
     </p:extLst>
   </p:cSld>
@@ -4113,7 +4200,7 @@
           </a:ln>
           <a:extLst>
             <a:ext uri="{909E8E84-426E-40dd-AFC4-6F175D3DCCD1}">
-              <a14:hiddenFill xmlns="" xmlns:a14="http://schemas.microsoft.com/office/drawing/2010/main">
+              <a14:hiddenFill xmlns:a14="http://schemas.microsoft.com/office/drawing/2010/main" xmlns="">
                 <a:noFill/>
               </a14:hiddenFill>
             </a:ext>
@@ -4151,14 +4238,14 @@
           </a:ln>
           <a:extLst>
             <a:ext uri="{909E8E84-426E-40dd-AFC4-6F175D3DCCD1}">
-              <a14:hiddenFill xmlns="" xmlns:a14="http://schemas.microsoft.com/office/drawing/2010/main">
+              <a14:hiddenFill xmlns:a14="http://schemas.microsoft.com/office/drawing/2010/main" xmlns="">
                 <a:solidFill>
                   <a:srgbClr val="FFFFFF"/>
                 </a:solidFill>
               </a14:hiddenFill>
             </a:ext>
             <a:ext uri="{91240B29-F687-4f45-9708-019B960494DF}">
-              <a14:hiddenLine xmlns="" xmlns:a14="http://schemas.microsoft.com/office/drawing/2010/main" w="9525">
+              <a14:hiddenLine xmlns:a14="http://schemas.microsoft.com/office/drawing/2010/main" xmlns="" w="9525">
                 <a:solidFill>
                   <a:srgbClr val="000000"/>
                 </a:solidFill>
@@ -4327,14 +4414,14 @@
           </a:ln>
           <a:extLst>
             <a:ext uri="{909E8E84-426E-40dd-AFC4-6F175D3DCCD1}">
-              <a14:hiddenFill xmlns="" xmlns:a14="http://schemas.microsoft.com/office/drawing/2010/main">
+              <a14:hiddenFill xmlns:a14="http://schemas.microsoft.com/office/drawing/2010/main" xmlns="">
                 <a:solidFill>
                   <a:srgbClr val="FFFFFF"/>
                 </a:solidFill>
               </a14:hiddenFill>
             </a:ext>
             <a:ext uri="{91240B29-F687-4f45-9708-019B960494DF}">
-              <a14:hiddenLine xmlns="" xmlns:a14="http://schemas.microsoft.com/office/drawing/2010/main" w="9525">
+              <a14:hiddenLine xmlns:a14="http://schemas.microsoft.com/office/drawing/2010/main" xmlns="" w="9525">
                 <a:solidFill>
                   <a:srgbClr val="000000"/>
                 </a:solidFill>
@@ -4381,14 +4468,14 @@
           </a:ln>
           <a:extLst>
             <a:ext uri="{909E8E84-426E-40dd-AFC4-6F175D3DCCD1}">
-              <a14:hiddenFill xmlns="" xmlns:a14="http://schemas.microsoft.com/office/drawing/2010/main">
+              <a14:hiddenFill xmlns:a14="http://schemas.microsoft.com/office/drawing/2010/main" xmlns="">
                 <a:solidFill>
                   <a:srgbClr val="FFFFFF"/>
                 </a:solidFill>
               </a14:hiddenFill>
             </a:ext>
             <a:ext uri="{91240B29-F687-4f45-9708-019B960494DF}">
-              <a14:hiddenLine xmlns="" xmlns:a14="http://schemas.microsoft.com/office/drawing/2010/main" w="9525">
+              <a14:hiddenLine xmlns:a14="http://schemas.microsoft.com/office/drawing/2010/main" xmlns="" w="9525">
                 <a:solidFill>
                   <a:srgbClr val="000000"/>
                 </a:solidFill>
@@ -4427,7 +4514,7 @@
           </a:ln>
           <a:extLst>
             <a:ext uri="{909E8E84-426E-40dd-AFC4-6F175D3DCCD1}">
-              <a14:hiddenFill xmlns="" xmlns:a14="http://schemas.microsoft.com/office/drawing/2010/main">
+              <a14:hiddenFill xmlns:a14="http://schemas.microsoft.com/office/drawing/2010/main" xmlns="">
                 <a:noFill/>
               </a14:hiddenFill>
             </a:ext>
@@ -4465,14 +4552,14 @@
           </a:ln>
           <a:extLst>
             <a:ext uri="{909E8E84-426E-40dd-AFC4-6F175D3DCCD1}">
-              <a14:hiddenFill xmlns="" xmlns:a14="http://schemas.microsoft.com/office/drawing/2010/main">
+              <a14:hiddenFill xmlns:a14="http://schemas.microsoft.com/office/drawing/2010/main" xmlns="">
                 <a:solidFill>
                   <a:srgbClr val="FFFFFF"/>
                 </a:solidFill>
               </a14:hiddenFill>
             </a:ext>
             <a:ext uri="{91240B29-F687-4f45-9708-019B960494DF}">
-              <a14:hiddenLine xmlns="" xmlns:a14="http://schemas.microsoft.com/office/drawing/2010/main" w="9525">
+              <a14:hiddenLine xmlns:a14="http://schemas.microsoft.com/office/drawing/2010/main" xmlns="" w="9525">
                 <a:solidFill>
                   <a:srgbClr val="000000"/>
                 </a:solidFill>
@@ -4633,7 +4720,7 @@
           </a:ln>
           <a:extLst>
             <a:ext uri="{909E8E84-426E-40dd-AFC4-6F175D3DCCD1}">
-              <a14:hiddenFill xmlns="" xmlns:a14="http://schemas.microsoft.com/office/drawing/2010/main">
+              <a14:hiddenFill xmlns:a14="http://schemas.microsoft.com/office/drawing/2010/main" xmlns="">
                 <a:noFill/>
               </a14:hiddenFill>
             </a:ext>
@@ -4671,14 +4758,14 @@
           </a:ln>
           <a:extLst>
             <a:ext uri="{909E8E84-426E-40dd-AFC4-6F175D3DCCD1}">
-              <a14:hiddenFill xmlns="" xmlns:a14="http://schemas.microsoft.com/office/drawing/2010/main">
+              <a14:hiddenFill xmlns:a14="http://schemas.microsoft.com/office/drawing/2010/main" xmlns="">
                 <a:solidFill>
                   <a:srgbClr val="FFFFFF"/>
                 </a:solidFill>
               </a14:hiddenFill>
             </a:ext>
             <a:ext uri="{91240B29-F687-4f45-9708-019B960494DF}">
-              <a14:hiddenLine xmlns="" xmlns:a14="http://schemas.microsoft.com/office/drawing/2010/main" w="9525">
+              <a14:hiddenLine xmlns:a14="http://schemas.microsoft.com/office/drawing/2010/main" xmlns="" w="9525">
                 <a:solidFill>
                   <a:srgbClr val="000000"/>
                 </a:solidFill>
@@ -6143,7 +6230,7 @@
           </a:ln>
           <a:extLst>
             <a:ext uri="{909E8E84-426E-40dd-AFC4-6F175D3DCCD1}">
-              <a14:hiddenFill xmlns="" xmlns:a14="http://schemas.microsoft.com/office/drawing/2010/main">
+              <a14:hiddenFill xmlns:a14="http://schemas.microsoft.com/office/drawing/2010/main" xmlns="">
                 <a:solidFill>
                   <a:srgbClr val="FFFFFF"/>
                 </a:solidFill>
@@ -6630,14 +6717,14 @@
           <a:ln/>
           <a:extLst>
             <a:ext uri="{909E8E84-426E-40dd-AFC4-6F175D3DCCD1}">
-              <a14:hiddenFill xmlns="" xmlns:a14="http://schemas.microsoft.com/office/drawing/2010/main">
+              <a14:hiddenFill xmlns:a14="http://schemas.microsoft.com/office/drawing/2010/main" xmlns="">
                 <a:solidFill>
                   <a:srgbClr val="FFFFFF"/>
                 </a:solidFill>
               </a14:hiddenFill>
             </a:ext>
             <a:ext uri="{91240B29-F687-4f45-9708-019B960494DF}">
-              <a14:hiddenLine xmlns="" xmlns:a14="http://schemas.microsoft.com/office/drawing/2010/main" w="9525">
+              <a14:hiddenLine xmlns:a14="http://schemas.microsoft.com/office/drawing/2010/main" xmlns="" w="9525">
                 <a:solidFill>
                   <a:srgbClr val="000000"/>
                 </a:solidFill>
@@ -10313,7 +10400,9 @@
         </p:nvSpPr>
         <p:spPr/>
         <p:txBody>
-          <a:bodyPr/>
+          <a:bodyPr>
+            <a:normAutofit/>
+          </a:bodyPr>
           <a:lstStyle/>
           <a:p>
             <a:r>
@@ -10343,7 +10432,7 @@
           <a:p>
             <a:r>
               <a:rPr lang="en-US" dirty="0"/>
-              <a:t>Cipher </a:t>
+              <a:t>Example: cipher </a:t>
             </a:r>
             <a:r>
               <a:rPr lang="en-US" dirty="0">
@@ -10356,6 +10445,13 @@
             <a:r>
               <a:rPr lang="en-US" dirty="0"/>
               <a:t> attacks</a:t>
+            </a:r>
+          </a:p>
+          <a:p>
+            <a:pPr lvl="1"/>
+            <a:r>
+              <a:rPr lang="en-US" dirty="0"/>
+              <a:t>Provide “backward integrity” over all prior messages</a:t>
             </a:r>
           </a:p>
         </p:txBody>
@@ -10407,6 +10503,55 @@
                                           <p:spTgt spid="3">
                                             <p:txEl>
                                               <p:pRg st="5" end="5"/>
+                                            </p:txEl>
+                                          </p:spTgt>
+                                        </p:tgtEl>
+                                        <p:attrNameLst>
+                                          <p:attrName>style.visibility</p:attrName>
+                                        </p:attrNameLst>
+                                      </p:cBhvr>
+                                      <p:to>
+                                        <p:strVal val="visible"/>
+                                      </p:to>
+                                    </p:set>
+                                  </p:childTnLst>
+                                </p:cTn>
+                              </p:par>
+                            </p:childTnLst>
+                          </p:cTn>
+                        </p:par>
+                      </p:childTnLst>
+                    </p:cTn>
+                  </p:par>
+                  <p:par>
+                    <p:cTn id="7" fill="hold">
+                      <p:stCondLst>
+                        <p:cond delay="indefinite"/>
+                      </p:stCondLst>
+                      <p:childTnLst>
+                        <p:par>
+                          <p:cTn id="8" fill="hold">
+                            <p:stCondLst>
+                              <p:cond delay="0"/>
+                            </p:stCondLst>
+                            <p:childTnLst>
+                              <p:par>
+                                <p:cTn id="9" presetID="1" presetClass="entr" presetSubtype="0" fill="hold" nodeType="clickEffect">
+                                  <p:stCondLst>
+                                    <p:cond delay="0"/>
+                                  </p:stCondLst>
+                                  <p:childTnLst>
+                                    <p:set>
+                                      <p:cBhvr>
+                                        <p:cTn id="10" dur="1" fill="hold">
+                                          <p:stCondLst>
+                                            <p:cond delay="0"/>
+                                          </p:stCondLst>
+                                        </p:cTn>
+                                        <p:tgtEl>
+                                          <p:spTgt spid="3">
+                                            <p:txEl>
+                                              <p:pRg st="6" end="6"/>
                                             </p:txEl>
                                           </p:spTgt>
                                         </p:tgtEl>
@@ -11801,7 +11946,7 @@
             </a:ln>
             <a:extLst>
               <a:ext uri="{909E8E84-426E-40dd-AFC4-6F175D3DCCD1}">
-                <a14:hiddenFill xmlns="" xmlns:a14="http://schemas.microsoft.com/office/drawing/2010/main">
+                <a14:hiddenFill xmlns:a14="http://schemas.microsoft.com/office/drawing/2010/main" xmlns="">
                   <a:solidFill>
                     <a:srgbClr val="FFFFFF"/>
                   </a:solidFill>
@@ -11842,14 +11987,14 @@
             </a:ln>
             <a:extLst>
               <a:ext uri="{909E8E84-426E-40dd-AFC4-6F175D3DCCD1}">
-                <a14:hiddenFill xmlns="" xmlns:a14="http://schemas.microsoft.com/office/drawing/2010/main">
+                <a14:hiddenFill xmlns:a14="http://schemas.microsoft.com/office/drawing/2010/main" xmlns="">
                   <a:solidFill>
                     <a:srgbClr val="FFFFFF"/>
                   </a:solidFill>
                 </a14:hiddenFill>
               </a:ext>
               <a:ext uri="{91240B29-F687-4f45-9708-019B960494DF}">
-                <a14:hiddenLine xmlns="" xmlns:a14="http://schemas.microsoft.com/office/drawing/2010/main" w="9525">
+                <a14:hiddenLine xmlns:a14="http://schemas.microsoft.com/office/drawing/2010/main" xmlns="" w="9525">
                   <a:solidFill>
                     <a:srgbClr val="000000"/>
                   </a:solidFill>
@@ -12010,7 +12155,7 @@
             </a:ln>
             <a:extLst>
               <a:ext uri="{909E8E84-426E-40dd-AFC4-6F175D3DCCD1}">
-                <a14:hiddenFill xmlns="" xmlns:a14="http://schemas.microsoft.com/office/drawing/2010/main">
+                <a14:hiddenFill xmlns:a14="http://schemas.microsoft.com/office/drawing/2010/main" xmlns="">
                   <a:solidFill>
                     <a:srgbClr val="FFFFFF"/>
                   </a:solidFill>
@@ -12051,14 +12196,14 @@
             </a:ln>
             <a:extLst>
               <a:ext uri="{909E8E84-426E-40dd-AFC4-6F175D3DCCD1}">
-                <a14:hiddenFill xmlns="" xmlns:a14="http://schemas.microsoft.com/office/drawing/2010/main">
+                <a14:hiddenFill xmlns:a14="http://schemas.microsoft.com/office/drawing/2010/main" xmlns="">
                   <a:solidFill>
                     <a:srgbClr val="FFFFFF"/>
                   </a:solidFill>
                 </a14:hiddenFill>
               </a:ext>
               <a:ext uri="{91240B29-F687-4f45-9708-019B960494DF}">
-                <a14:hiddenLine xmlns="" xmlns:a14="http://schemas.microsoft.com/office/drawing/2010/main" w="9525">
+                <a14:hiddenLine xmlns:a14="http://schemas.microsoft.com/office/drawing/2010/main" xmlns="" w="9525">
                   <a:solidFill>
                     <a:srgbClr val="000000"/>
                   </a:solidFill>
@@ -12219,7 +12364,7 @@
             </a:ln>
             <a:extLst>
               <a:ext uri="{909E8E84-426E-40dd-AFC4-6F175D3DCCD1}">
-                <a14:hiddenFill xmlns="" xmlns:a14="http://schemas.microsoft.com/office/drawing/2010/main">
+                <a14:hiddenFill xmlns:a14="http://schemas.microsoft.com/office/drawing/2010/main" xmlns="">
                   <a:solidFill>
                     <a:srgbClr val="FFFFFF"/>
                   </a:solidFill>
@@ -12260,14 +12405,14 @@
             </a:ln>
             <a:extLst>
               <a:ext uri="{909E8E84-426E-40dd-AFC4-6F175D3DCCD1}">
-                <a14:hiddenFill xmlns="" xmlns:a14="http://schemas.microsoft.com/office/drawing/2010/main">
+                <a14:hiddenFill xmlns:a14="http://schemas.microsoft.com/office/drawing/2010/main" xmlns="">
                   <a:solidFill>
                     <a:srgbClr val="FFFFFF"/>
                   </a:solidFill>
                 </a14:hiddenFill>
               </a:ext>
               <a:ext uri="{91240B29-F687-4f45-9708-019B960494DF}">
-                <a14:hiddenLine xmlns="" xmlns:a14="http://schemas.microsoft.com/office/drawing/2010/main" w="9525">
+                <a14:hiddenLine xmlns:a14="http://schemas.microsoft.com/office/drawing/2010/main" xmlns="" w="9525">
                   <a:solidFill>
                     <a:srgbClr val="000000"/>
                   </a:solidFill>
@@ -12423,14 +12568,14 @@
             </a:ln>
             <a:extLst>
               <a:ext uri="{909E8E84-426E-40dd-AFC4-6F175D3DCCD1}">
-                <a14:hiddenFill xmlns="" xmlns:a14="http://schemas.microsoft.com/office/drawing/2010/main">
+                <a14:hiddenFill xmlns:a14="http://schemas.microsoft.com/office/drawing/2010/main" xmlns="">
                   <a:solidFill>
                     <a:srgbClr val="FFFFFF"/>
                   </a:solidFill>
                 </a14:hiddenFill>
               </a:ext>
               <a:ext uri="{91240B29-F687-4f45-9708-019B960494DF}">
-                <a14:hiddenLine xmlns="" xmlns:a14="http://schemas.microsoft.com/office/drawing/2010/main" w="9525">
+                <a14:hiddenLine xmlns:a14="http://schemas.microsoft.com/office/drawing/2010/main" xmlns="" w="9525">
                   <a:solidFill>
                     <a:srgbClr val="000000"/>
                   </a:solidFill>
@@ -12611,7 +12756,7 @@
             </a:ln>
             <a:extLst>
               <a:ext uri="{909E8E84-426E-40dd-AFC4-6F175D3DCCD1}">
-                <a14:hiddenFill xmlns="" xmlns:a14="http://schemas.microsoft.com/office/drawing/2010/main">
+                <a14:hiddenFill xmlns:a14="http://schemas.microsoft.com/office/drawing/2010/main" xmlns="">
                   <a:solidFill>
                     <a:srgbClr val="FFFFFF"/>
                   </a:solidFill>
@@ -12652,14 +12797,14 @@
             </a:ln>
             <a:extLst>
               <a:ext uri="{909E8E84-426E-40dd-AFC4-6F175D3DCCD1}">
-                <a14:hiddenFill xmlns="" xmlns:a14="http://schemas.microsoft.com/office/drawing/2010/main">
+                <a14:hiddenFill xmlns:a14="http://schemas.microsoft.com/office/drawing/2010/main" xmlns="">
                   <a:solidFill>
                     <a:srgbClr val="FFFFFF"/>
                   </a:solidFill>
                 </a14:hiddenFill>
               </a:ext>
               <a:ext uri="{91240B29-F687-4f45-9708-019B960494DF}">
-                <a14:hiddenLine xmlns="" xmlns:a14="http://schemas.microsoft.com/office/drawing/2010/main" w="9525">
+                <a14:hiddenLine xmlns:a14="http://schemas.microsoft.com/office/drawing/2010/main" xmlns="" w="9525">
                   <a:solidFill>
                     <a:srgbClr val="000000"/>
                   </a:solidFill>
@@ -12859,7 +13004,7 @@
             </a:ln>
             <a:extLst>
               <a:ext uri="{909E8E84-426E-40dd-AFC4-6F175D3DCCD1}">
-                <a14:hiddenFill xmlns="" xmlns:a14="http://schemas.microsoft.com/office/drawing/2010/main">
+                <a14:hiddenFill xmlns:a14="http://schemas.microsoft.com/office/drawing/2010/main" xmlns="">
                   <a:solidFill>
                     <a:srgbClr val="FFFFFF"/>
                   </a:solidFill>
@@ -12905,7 +13050,7 @@
             </a:ln>
             <a:extLst>
               <a:ext uri="{909E8E84-426E-40dd-AFC4-6F175D3DCCD1}">
-                <a14:hiddenFill xmlns="" xmlns:a14="http://schemas.microsoft.com/office/drawing/2010/main">
+                <a14:hiddenFill xmlns:a14="http://schemas.microsoft.com/office/drawing/2010/main" xmlns="">
                   <a:solidFill>
                     <a:srgbClr val="FFFFFF"/>
                   </a:solidFill>
@@ -12946,14 +13091,14 @@
             </a:ln>
             <a:extLst>
               <a:ext uri="{909E8E84-426E-40dd-AFC4-6F175D3DCCD1}">
-                <a14:hiddenFill xmlns="" xmlns:a14="http://schemas.microsoft.com/office/drawing/2010/main">
+                <a14:hiddenFill xmlns:a14="http://schemas.microsoft.com/office/drawing/2010/main" xmlns="">
                   <a:solidFill>
                     <a:srgbClr val="FFFFFF"/>
                   </a:solidFill>
                 </a14:hiddenFill>
               </a:ext>
               <a:ext uri="{91240B29-F687-4f45-9708-019B960494DF}">
-                <a14:hiddenLine xmlns="" xmlns:a14="http://schemas.microsoft.com/office/drawing/2010/main" w="9525">
+                <a14:hiddenLine xmlns:a14="http://schemas.microsoft.com/office/drawing/2010/main" xmlns="" w="9525">
                   <a:solidFill>
                     <a:srgbClr val="000000"/>
                   </a:solidFill>
@@ -13109,14 +13254,14 @@
             </a:ln>
             <a:extLst>
               <a:ext uri="{909E8E84-426E-40dd-AFC4-6F175D3DCCD1}">
-                <a14:hiddenFill xmlns="" xmlns:a14="http://schemas.microsoft.com/office/drawing/2010/main">
+                <a14:hiddenFill xmlns:a14="http://schemas.microsoft.com/office/drawing/2010/main" xmlns="">
                   <a:solidFill>
                     <a:srgbClr val="FFFFFF"/>
                   </a:solidFill>
                 </a14:hiddenFill>
               </a:ext>
               <a:ext uri="{91240B29-F687-4f45-9708-019B960494DF}">
-                <a14:hiddenLine xmlns="" xmlns:a14="http://schemas.microsoft.com/office/drawing/2010/main" w="9525">
+                <a14:hiddenLine xmlns:a14="http://schemas.microsoft.com/office/drawing/2010/main" xmlns="" w="9525">
                   <a:solidFill>
                     <a:srgbClr val="000000"/>
                   </a:solidFill>
@@ -13272,14 +13417,14 @@
             </a:ln>
             <a:extLst>
               <a:ext uri="{909E8E84-426E-40dd-AFC4-6F175D3DCCD1}">
-                <a14:hiddenFill xmlns="" xmlns:a14="http://schemas.microsoft.com/office/drawing/2010/main">
+                <a14:hiddenFill xmlns:a14="http://schemas.microsoft.com/office/drawing/2010/main" xmlns="">
                   <a:solidFill>
                     <a:srgbClr val="FFFFFF"/>
                   </a:solidFill>
                 </a14:hiddenFill>
               </a:ext>
               <a:ext uri="{91240B29-F687-4f45-9708-019B960494DF}">
-                <a14:hiddenLine xmlns="" xmlns:a14="http://schemas.microsoft.com/office/drawing/2010/main" w="9525">
+                <a14:hiddenLine xmlns:a14="http://schemas.microsoft.com/office/drawing/2010/main" xmlns="" w="9525">
                   <a:solidFill>
                     <a:srgbClr val="000000"/>
                   </a:solidFill>
@@ -13435,14 +13580,14 @@
             </a:ln>
             <a:extLst>
               <a:ext uri="{909E8E84-426E-40dd-AFC4-6F175D3DCCD1}">
-                <a14:hiddenFill xmlns="" xmlns:a14="http://schemas.microsoft.com/office/drawing/2010/main">
+                <a14:hiddenFill xmlns:a14="http://schemas.microsoft.com/office/drawing/2010/main" xmlns="">
                   <a:solidFill>
                     <a:srgbClr val="FFFFFF"/>
                   </a:solidFill>
                 </a14:hiddenFill>
               </a:ext>
               <a:ext uri="{91240B29-F687-4f45-9708-019B960494DF}">
-                <a14:hiddenLine xmlns="" xmlns:a14="http://schemas.microsoft.com/office/drawing/2010/main" w="9525">
+                <a14:hiddenLine xmlns:a14="http://schemas.microsoft.com/office/drawing/2010/main" xmlns="" w="9525">
                   <a:solidFill>
                     <a:srgbClr val="000000"/>
                   </a:solidFill>
@@ -13603,14 +13748,14 @@
           </a:ln>
           <a:extLst>
             <a:ext uri="{909E8E84-426E-40dd-AFC4-6F175D3DCCD1}">
-              <a14:hiddenFill xmlns="" xmlns:a14="http://schemas.microsoft.com/office/drawing/2010/main">
+              <a14:hiddenFill xmlns:a14="http://schemas.microsoft.com/office/drawing/2010/main" xmlns="">
                 <a:solidFill>
                   <a:srgbClr val="FFFFFF"/>
                 </a:solidFill>
               </a14:hiddenFill>
             </a:ext>
             <a:ext uri="{91240B29-F687-4f45-9708-019B960494DF}">
-              <a14:hiddenLine xmlns="" xmlns:a14="http://schemas.microsoft.com/office/drawing/2010/main" w="9525">
+              <a14:hiddenLine xmlns:a14="http://schemas.microsoft.com/office/drawing/2010/main" xmlns="" w="9525">
                 <a:solidFill>
                   <a:srgbClr val="000000"/>
                 </a:solidFill>
@@ -13799,14 +13944,14 @@
           <a:ln/>
           <a:extLst>
             <a:ext uri="{909E8E84-426E-40dd-AFC4-6F175D3DCCD1}">
-              <a14:hiddenFill xmlns="" xmlns:a14="http://schemas.microsoft.com/office/drawing/2010/main">
+              <a14:hiddenFill xmlns:a14="http://schemas.microsoft.com/office/drawing/2010/main" xmlns="">
                 <a:solidFill>
                   <a:srgbClr val="FFFFFF"/>
                 </a:solidFill>
               </a14:hiddenFill>
             </a:ext>
             <a:ext uri="{91240B29-F687-4f45-9708-019B960494DF}">
-              <a14:hiddenLine xmlns="" xmlns:a14="http://schemas.microsoft.com/office/drawing/2010/main" w="9525">
+              <a14:hiddenLine xmlns:a14="http://schemas.microsoft.com/office/drawing/2010/main" xmlns="" w="9525">
                 <a:solidFill>
                   <a:srgbClr val="000000"/>
                 </a:solidFill>
@@ -14272,14 +14417,14 @@
           </a:ln>
           <a:extLst>
             <a:ext uri="{909E8E84-426E-40dd-AFC4-6F175D3DCCD1}">
-              <a14:hiddenFill xmlns:a14="http://schemas.microsoft.com/office/drawing/2010/main" xmlns="">
+              <a14:hiddenFill xmlns="" xmlns:a14="http://schemas.microsoft.com/office/drawing/2010/main">
                 <a:solidFill>
                   <a:srgbClr val="FFFFFF"/>
                 </a:solidFill>
               </a14:hiddenFill>
             </a:ext>
             <a:ext uri="{91240B29-F687-4f45-9708-019B960494DF}">
-              <a14:hiddenLine xmlns:a14="http://schemas.microsoft.com/office/drawing/2010/main" xmlns="" w="9525">
+              <a14:hiddenLine xmlns="" xmlns:a14="http://schemas.microsoft.com/office/drawing/2010/main" w="9525">
                 <a:solidFill>
                   <a:srgbClr val="000000"/>
                 </a:solidFill>
@@ -14523,7 +14668,7 @@
           </a:ln>
           <a:extLst>
             <a:ext uri="{909E8E84-426E-40dd-AFC4-6F175D3DCCD1}">
-              <a14:hiddenFill xmlns:a14="http://schemas.microsoft.com/office/drawing/2010/main" xmlns="">
+              <a14:hiddenFill xmlns="" xmlns:a14="http://schemas.microsoft.com/office/drawing/2010/main">
                 <a:solidFill>
                   <a:srgbClr val="FFFFFF"/>
                 </a:solidFill>
@@ -14568,7 +14713,7 @@
           </a:ln>
           <a:extLst>
             <a:ext uri="{909E8E84-426E-40dd-AFC4-6F175D3DCCD1}">
-              <a14:hiddenFill xmlns:a14="http://schemas.microsoft.com/office/drawing/2010/main" xmlns="">
+              <a14:hiddenFill xmlns="" xmlns:a14="http://schemas.microsoft.com/office/drawing/2010/main">
                 <a:noFill/>
               </a14:hiddenFill>
             </a:ext>
@@ -14661,14 +14806,14 @@
             </a:ln>
             <a:extLst>
               <a:ext uri="{909E8E84-426E-40dd-AFC4-6F175D3DCCD1}">
-                <a14:hiddenFill xmlns:a14="http://schemas.microsoft.com/office/drawing/2010/main" xmlns="">
+                <a14:hiddenFill xmlns="" xmlns:a14="http://schemas.microsoft.com/office/drawing/2010/main">
                   <a:solidFill>
                     <a:srgbClr val="FFFFFF"/>
                   </a:solidFill>
                 </a14:hiddenFill>
               </a:ext>
               <a:ext uri="{91240B29-F687-4f45-9708-019B960494DF}">
-                <a14:hiddenLine xmlns:a14="http://schemas.microsoft.com/office/drawing/2010/main" xmlns="" w="9525">
+                <a14:hiddenLine xmlns="" xmlns:a14="http://schemas.microsoft.com/office/drawing/2010/main" w="9525">
                   <a:solidFill>
                     <a:srgbClr val="000000"/>
                   </a:solidFill>
@@ -14825,14 +14970,14 @@
             </a:ln>
             <a:extLst>
               <a:ext uri="{909E8E84-426E-40dd-AFC4-6F175D3DCCD1}">
-                <a14:hiddenFill xmlns:a14="http://schemas.microsoft.com/office/drawing/2010/main" xmlns="">
+                <a14:hiddenFill xmlns="" xmlns:a14="http://schemas.microsoft.com/office/drawing/2010/main">
                   <a:solidFill>
                     <a:srgbClr val="FFFFFF"/>
                   </a:solidFill>
                 </a14:hiddenFill>
               </a:ext>
               <a:ext uri="{91240B29-F687-4f45-9708-019B960494DF}">
-                <a14:hiddenLine xmlns:a14="http://schemas.microsoft.com/office/drawing/2010/main" xmlns="" w="9525">
+                <a14:hiddenLine xmlns="" xmlns:a14="http://schemas.microsoft.com/office/drawing/2010/main" w="9525">
                   <a:solidFill>
                     <a:srgbClr val="000000"/>
                   </a:solidFill>
@@ -15045,14 +15190,14 @@
             </a:ln>
             <a:extLst>
               <a:ext uri="{909E8E84-426E-40dd-AFC4-6F175D3DCCD1}">
-                <a14:hiddenFill xmlns:a14="http://schemas.microsoft.com/office/drawing/2010/main" xmlns="">
+                <a14:hiddenFill xmlns="" xmlns:a14="http://schemas.microsoft.com/office/drawing/2010/main">
                   <a:solidFill>
                     <a:srgbClr val="FFFFFF"/>
                   </a:solidFill>
                 </a14:hiddenFill>
               </a:ext>
               <a:ext uri="{91240B29-F687-4f45-9708-019B960494DF}">
-                <a14:hiddenLine xmlns:a14="http://schemas.microsoft.com/office/drawing/2010/main" xmlns="" w="9525">
+                <a14:hiddenLine xmlns="" xmlns:a14="http://schemas.microsoft.com/office/drawing/2010/main" w="9525">
                   <a:solidFill>
                     <a:srgbClr val="000000"/>
                   </a:solidFill>
@@ -15223,14 +15368,14 @@
             </a:ln>
             <a:extLst>
               <a:ext uri="{909E8E84-426E-40dd-AFC4-6F175D3DCCD1}">
-                <a14:hiddenFill xmlns:a14="http://schemas.microsoft.com/office/drawing/2010/main" xmlns="">
+                <a14:hiddenFill xmlns="" xmlns:a14="http://schemas.microsoft.com/office/drawing/2010/main">
                   <a:solidFill>
                     <a:srgbClr val="FFFFFF"/>
                   </a:solidFill>
                 </a14:hiddenFill>
               </a:ext>
               <a:ext uri="{91240B29-F687-4f45-9708-019B960494DF}">
-                <a14:hiddenLine xmlns:a14="http://schemas.microsoft.com/office/drawing/2010/main" xmlns="" w="9525">
+                <a14:hiddenLine xmlns="" xmlns:a14="http://schemas.microsoft.com/office/drawing/2010/main" w="9525">
                   <a:solidFill>
                     <a:srgbClr val="000000"/>
                   </a:solidFill>
@@ -15387,14 +15532,14 @@
             </a:ln>
             <a:extLst>
               <a:ext uri="{909E8E84-426E-40dd-AFC4-6F175D3DCCD1}">
-                <a14:hiddenFill xmlns:a14="http://schemas.microsoft.com/office/drawing/2010/main" xmlns="">
+                <a14:hiddenFill xmlns="" xmlns:a14="http://schemas.microsoft.com/office/drawing/2010/main">
                   <a:solidFill>
                     <a:srgbClr val="FFFFFF"/>
                   </a:solidFill>
                 </a14:hiddenFill>
               </a:ext>
               <a:ext uri="{91240B29-F687-4f45-9708-019B960494DF}">
-                <a14:hiddenLine xmlns:a14="http://schemas.microsoft.com/office/drawing/2010/main" xmlns="" w="9525">
+                <a14:hiddenLine xmlns="" xmlns:a14="http://schemas.microsoft.com/office/drawing/2010/main" w="9525">
                   <a:solidFill>
                     <a:srgbClr val="000000"/>
                   </a:solidFill>
@@ -15607,14 +15752,14 @@
             </a:ln>
             <a:extLst>
               <a:ext uri="{909E8E84-426E-40dd-AFC4-6F175D3DCCD1}">
-                <a14:hiddenFill xmlns:a14="http://schemas.microsoft.com/office/drawing/2010/main" xmlns="">
+                <a14:hiddenFill xmlns="" xmlns:a14="http://schemas.microsoft.com/office/drawing/2010/main">
                   <a:solidFill>
                     <a:srgbClr val="FFFFFF"/>
                   </a:solidFill>
                 </a14:hiddenFill>
               </a:ext>
               <a:ext uri="{91240B29-F687-4f45-9708-019B960494DF}">
-                <a14:hiddenLine xmlns:a14="http://schemas.microsoft.com/office/drawing/2010/main" xmlns="" w="9525">
+                <a14:hiddenLine xmlns="" xmlns:a14="http://schemas.microsoft.com/office/drawing/2010/main" w="9525">
                   <a:solidFill>
                     <a:srgbClr val="000000"/>
                   </a:solidFill>
@@ -15792,14 +15937,14 @@
             </a:ln>
             <a:extLst>
               <a:ext uri="{909E8E84-426E-40dd-AFC4-6F175D3DCCD1}">
-                <a14:hiddenFill xmlns:a14="http://schemas.microsoft.com/office/drawing/2010/main" xmlns="">
+                <a14:hiddenFill xmlns="" xmlns:a14="http://schemas.microsoft.com/office/drawing/2010/main">
                   <a:solidFill>
                     <a:srgbClr val="FFFFFF"/>
                   </a:solidFill>
                 </a14:hiddenFill>
               </a:ext>
               <a:ext uri="{91240B29-F687-4f45-9708-019B960494DF}">
-                <a14:hiddenLine xmlns:a14="http://schemas.microsoft.com/office/drawing/2010/main" xmlns="" w="9525">
+                <a14:hiddenLine xmlns="" xmlns:a14="http://schemas.microsoft.com/office/drawing/2010/main" w="9525">
                   <a:solidFill>
                     <a:srgbClr val="000000"/>
                   </a:solidFill>
@@ -15970,14 +16115,14 @@
             </a:ln>
             <a:extLst>
               <a:ext uri="{909E8E84-426E-40dd-AFC4-6F175D3DCCD1}">
-                <a14:hiddenFill xmlns:a14="http://schemas.microsoft.com/office/drawing/2010/main" xmlns="">
+                <a14:hiddenFill xmlns="" xmlns:a14="http://schemas.microsoft.com/office/drawing/2010/main">
                   <a:solidFill>
                     <a:srgbClr val="FFFFFF"/>
                   </a:solidFill>
                 </a14:hiddenFill>
               </a:ext>
               <a:ext uri="{91240B29-F687-4f45-9708-019B960494DF}">
-                <a14:hiddenLine xmlns:a14="http://schemas.microsoft.com/office/drawing/2010/main" xmlns="" w="9525">
+                <a14:hiddenLine xmlns="" xmlns:a14="http://schemas.microsoft.com/office/drawing/2010/main" w="9525">
                   <a:solidFill>
                     <a:srgbClr val="000000"/>
                   </a:solidFill>
@@ -16181,7 +16326,7 @@
           </a:ln>
           <a:extLst>
             <a:ext uri="{909E8E84-426E-40dd-AFC4-6F175D3DCCD1}">
-              <a14:hiddenFill xmlns:a14="http://schemas.microsoft.com/office/drawing/2010/main" xmlns="">
+              <a14:hiddenFill xmlns="" xmlns:a14="http://schemas.microsoft.com/office/drawing/2010/main">
                 <a:solidFill>
                   <a:srgbClr val="FFFFFF"/>
                 </a:solidFill>
@@ -16221,14 +16366,14 @@
           </a:ln>
           <a:extLst>
             <a:ext uri="{909E8E84-426E-40dd-AFC4-6F175D3DCCD1}">
-              <a14:hiddenFill xmlns:a14="http://schemas.microsoft.com/office/drawing/2010/main" xmlns="">
+              <a14:hiddenFill xmlns="" xmlns:a14="http://schemas.microsoft.com/office/drawing/2010/main">
                 <a:solidFill>
                   <a:srgbClr val="FFFFFF"/>
                 </a:solidFill>
               </a14:hiddenFill>
             </a:ext>
             <a:ext uri="{91240B29-F687-4f45-9708-019B960494DF}">
-              <a14:hiddenLine xmlns:a14="http://schemas.microsoft.com/office/drawing/2010/main" xmlns="" w="9525">
+              <a14:hiddenLine xmlns="" xmlns:a14="http://schemas.microsoft.com/office/drawing/2010/main" w="9525">
                 <a:solidFill>
                   <a:srgbClr val="000000"/>
                 </a:solidFill>
@@ -16401,14 +16546,14 @@
             </a:ln>
             <a:extLst>
               <a:ext uri="{909E8E84-426E-40dd-AFC4-6F175D3DCCD1}">
-                <a14:hiddenFill xmlns:a14="http://schemas.microsoft.com/office/drawing/2010/main" xmlns="">
+                <a14:hiddenFill xmlns="" xmlns:a14="http://schemas.microsoft.com/office/drawing/2010/main">
                   <a:solidFill>
                     <a:srgbClr val="FFFFFF"/>
                   </a:solidFill>
                 </a14:hiddenFill>
               </a:ext>
               <a:ext uri="{91240B29-F687-4f45-9708-019B960494DF}">
-                <a14:hiddenLine xmlns:a14="http://schemas.microsoft.com/office/drawing/2010/main" xmlns="" w="9525">
+                <a14:hiddenLine xmlns="" xmlns:a14="http://schemas.microsoft.com/office/drawing/2010/main" w="9525">
                   <a:solidFill>
                     <a:srgbClr val="000000"/>
                   </a:solidFill>
@@ -16576,14 +16721,14 @@
             </a:ln>
             <a:extLst>
               <a:ext uri="{909E8E84-426E-40dd-AFC4-6F175D3DCCD1}">
-                <a14:hiddenFill xmlns:a14="http://schemas.microsoft.com/office/drawing/2010/main" xmlns="">
+                <a14:hiddenFill xmlns="" xmlns:a14="http://schemas.microsoft.com/office/drawing/2010/main">
                   <a:solidFill>
                     <a:srgbClr val="FFFFFF"/>
                   </a:solidFill>
                 </a14:hiddenFill>
               </a:ext>
               <a:ext uri="{91240B29-F687-4f45-9708-019B960494DF}">
-                <a14:hiddenLine xmlns:a14="http://schemas.microsoft.com/office/drawing/2010/main" xmlns="" w="9525">
+                <a14:hiddenLine xmlns="" xmlns:a14="http://schemas.microsoft.com/office/drawing/2010/main" w="9525">
                   <a:solidFill>
                     <a:srgbClr val="000000"/>
                   </a:solidFill>
@@ -16747,7 +16892,7 @@
           </a:ln>
           <a:extLst>
             <a:ext uri="{909E8E84-426E-40dd-AFC4-6F175D3DCCD1}">
-              <a14:hiddenFill xmlns:a14="http://schemas.microsoft.com/office/drawing/2010/main" xmlns="">
+              <a14:hiddenFill xmlns="" xmlns:a14="http://schemas.microsoft.com/office/drawing/2010/main">
                 <a:noFill/>
               </a14:hiddenFill>
             </a:ext>
@@ -16798,14 +16943,14 @@
           </a:ln>
           <a:extLst>
             <a:ext uri="{909E8E84-426E-40dd-AFC4-6F175D3DCCD1}">
-              <a14:hiddenFill xmlns:a14="http://schemas.microsoft.com/office/drawing/2010/main" xmlns="">
+              <a14:hiddenFill xmlns="" xmlns:a14="http://schemas.microsoft.com/office/drawing/2010/main">
                 <a:solidFill>
                   <a:srgbClr val="FFFFFF"/>
                 </a:solidFill>
               </a14:hiddenFill>
             </a:ext>
             <a:ext uri="{91240B29-F687-4f45-9708-019B960494DF}">
-              <a14:hiddenLine xmlns:a14="http://schemas.microsoft.com/office/drawing/2010/main" xmlns="" w="9525">
+              <a14:hiddenLine xmlns="" xmlns:a14="http://schemas.microsoft.com/office/drawing/2010/main" w="9525">
                 <a:solidFill>
                   <a:srgbClr val="000000"/>
                 </a:solidFill>
@@ -16852,14 +16997,14 @@
           </a:ln>
           <a:extLst>
             <a:ext uri="{909E8E84-426E-40dd-AFC4-6F175D3DCCD1}">
-              <a14:hiddenFill xmlns:a14="http://schemas.microsoft.com/office/drawing/2010/main" xmlns="">
+              <a14:hiddenFill xmlns="" xmlns:a14="http://schemas.microsoft.com/office/drawing/2010/main">
                 <a:solidFill>
                   <a:srgbClr val="FFFFFF"/>
                 </a:solidFill>
               </a14:hiddenFill>
             </a:ext>
             <a:ext uri="{91240B29-F687-4f45-9708-019B960494DF}">
-              <a14:hiddenLine xmlns:a14="http://schemas.microsoft.com/office/drawing/2010/main" xmlns="" w="9525">
+              <a14:hiddenLine xmlns="" xmlns:a14="http://schemas.microsoft.com/office/drawing/2010/main" w="9525">
                 <a:solidFill>
                   <a:srgbClr val="000000"/>
                 </a:solidFill>
@@ -16893,14 +17038,14 @@
           </a:ln>
           <a:extLst>
             <a:ext uri="{909E8E84-426E-40dd-AFC4-6F175D3DCCD1}">
-              <a14:hiddenFill xmlns:a14="http://schemas.microsoft.com/office/drawing/2010/main" xmlns="">
+              <a14:hiddenFill xmlns="" xmlns:a14="http://schemas.microsoft.com/office/drawing/2010/main">
                 <a:solidFill>
                   <a:srgbClr val="FFFFFF"/>
                 </a:solidFill>
               </a14:hiddenFill>
             </a:ext>
             <a:ext uri="{91240B29-F687-4f45-9708-019B960494DF}">
-              <a14:hiddenLine xmlns:a14="http://schemas.microsoft.com/office/drawing/2010/main" xmlns="" w="9525">
+              <a14:hiddenLine xmlns="" xmlns:a14="http://schemas.microsoft.com/office/drawing/2010/main" w="9525">
                 <a:solidFill>
                   <a:srgbClr val="000000"/>
                 </a:solidFill>
@@ -17193,7 +17338,7 @@
           </a:ln>
           <a:extLst>
             <a:ext uri="{91240B29-F687-4f45-9708-019B960494DF}">
-              <a14:hiddenLine xmlns:a14="http://schemas.microsoft.com/office/drawing/2010/main" xmlns="" w="9525">
+              <a14:hiddenLine xmlns="" xmlns:a14="http://schemas.microsoft.com/office/drawing/2010/main" w="9525">
                 <a:solidFill>
                   <a:srgbClr val="000000"/>
                 </a:solidFill>
@@ -17241,7 +17386,7 @@
           </a:ln>
           <a:extLst>
             <a:ext uri="{909E8E84-426E-40dd-AFC4-6F175D3DCCD1}">
-              <a14:hiddenFill xmlns:a14="http://schemas.microsoft.com/office/drawing/2010/main" xmlns="">
+              <a14:hiddenFill xmlns="" xmlns:a14="http://schemas.microsoft.com/office/drawing/2010/main">
                 <a:noFill/>
               </a14:hiddenFill>
             </a:ext>
@@ -17292,14 +17437,14 @@
           </a:ln>
           <a:extLst>
             <a:ext uri="{909E8E84-426E-40dd-AFC4-6F175D3DCCD1}">
-              <a14:hiddenFill xmlns:a14="http://schemas.microsoft.com/office/drawing/2010/main" xmlns="">
+              <a14:hiddenFill xmlns="" xmlns:a14="http://schemas.microsoft.com/office/drawing/2010/main">
                 <a:solidFill>
                   <a:srgbClr val="FFFFFF"/>
                 </a:solidFill>
               </a14:hiddenFill>
             </a:ext>
             <a:ext uri="{91240B29-F687-4f45-9708-019B960494DF}">
-              <a14:hiddenLine xmlns:a14="http://schemas.microsoft.com/office/drawing/2010/main" xmlns="" w="9525">
+              <a14:hiddenLine xmlns="" xmlns:a14="http://schemas.microsoft.com/office/drawing/2010/main" w="9525">
                 <a:solidFill>
                   <a:srgbClr val="000000"/>
                 </a:solidFill>
@@ -17346,14 +17491,14 @@
           </a:ln>
           <a:extLst>
             <a:ext uri="{909E8E84-426E-40dd-AFC4-6F175D3DCCD1}">
-              <a14:hiddenFill xmlns:a14="http://schemas.microsoft.com/office/drawing/2010/main" xmlns="">
+              <a14:hiddenFill xmlns="" xmlns:a14="http://schemas.microsoft.com/office/drawing/2010/main">
                 <a:solidFill>
                   <a:srgbClr val="FFFFFF"/>
                 </a:solidFill>
               </a14:hiddenFill>
             </a:ext>
             <a:ext uri="{91240B29-F687-4f45-9708-019B960494DF}">
-              <a14:hiddenLine xmlns:a14="http://schemas.microsoft.com/office/drawing/2010/main" xmlns="" w="9525">
+              <a14:hiddenLine xmlns="" xmlns:a14="http://schemas.microsoft.com/office/drawing/2010/main" w="9525">
                 <a:solidFill>
                   <a:srgbClr val="000000"/>
                 </a:solidFill>
@@ -17442,14 +17587,14 @@
             </a:ln>
             <a:extLst>
               <a:ext uri="{909E8E84-426E-40dd-AFC4-6F175D3DCCD1}">
-                <a14:hiddenFill xmlns:a14="http://schemas.microsoft.com/office/drawing/2010/main" xmlns="">
+                <a14:hiddenFill xmlns="" xmlns:a14="http://schemas.microsoft.com/office/drawing/2010/main">
                   <a:solidFill>
                     <a:srgbClr val="FFFFFF"/>
                   </a:solidFill>
                 </a14:hiddenFill>
               </a:ext>
               <a:ext uri="{91240B29-F687-4f45-9708-019B960494DF}">
-                <a14:hiddenLine xmlns:a14="http://schemas.microsoft.com/office/drawing/2010/main" xmlns="" w="9525">
+                <a14:hiddenLine xmlns="" xmlns:a14="http://schemas.microsoft.com/office/drawing/2010/main" w="9525">
                   <a:solidFill>
                     <a:srgbClr val="000000"/>
                   </a:solidFill>
@@ -17620,14 +17765,14 @@
             </a:ln>
             <a:extLst>
               <a:ext uri="{909E8E84-426E-40dd-AFC4-6F175D3DCCD1}">
-                <a14:hiddenFill xmlns:a14="http://schemas.microsoft.com/office/drawing/2010/main" xmlns="">
+                <a14:hiddenFill xmlns="" xmlns:a14="http://schemas.microsoft.com/office/drawing/2010/main">
                   <a:solidFill>
                     <a:srgbClr val="FFFFFF"/>
                   </a:solidFill>
                 </a14:hiddenFill>
               </a:ext>
               <a:ext uri="{91240B29-F687-4f45-9708-019B960494DF}">
-                <a14:hiddenLine xmlns:a14="http://schemas.microsoft.com/office/drawing/2010/main" xmlns="" w="9525">
+                <a14:hiddenLine xmlns="" xmlns:a14="http://schemas.microsoft.com/office/drawing/2010/main" w="9525">
                   <a:solidFill>
                     <a:srgbClr val="000000"/>
                   </a:solidFill>
@@ -17840,14 +17985,14 @@
             </a:ln>
             <a:extLst>
               <a:ext uri="{909E8E84-426E-40dd-AFC4-6F175D3DCCD1}">
-                <a14:hiddenFill xmlns:a14="http://schemas.microsoft.com/office/drawing/2010/main" xmlns="">
+                <a14:hiddenFill xmlns="" xmlns:a14="http://schemas.microsoft.com/office/drawing/2010/main">
                   <a:solidFill>
                     <a:srgbClr val="FFFFFF"/>
                   </a:solidFill>
                 </a14:hiddenFill>
               </a:ext>
               <a:ext uri="{91240B29-F687-4f45-9708-019B960494DF}">
-                <a14:hiddenLine xmlns:a14="http://schemas.microsoft.com/office/drawing/2010/main" xmlns="" w="9525">
+                <a14:hiddenLine xmlns="" xmlns:a14="http://schemas.microsoft.com/office/drawing/2010/main" w="9525">
                   <a:solidFill>
                     <a:srgbClr val="000000"/>
                   </a:solidFill>
@@ -18018,14 +18163,14 @@
             </a:ln>
             <a:extLst>
               <a:ext uri="{909E8E84-426E-40dd-AFC4-6F175D3DCCD1}">
-                <a14:hiddenFill xmlns:a14="http://schemas.microsoft.com/office/drawing/2010/main" xmlns="">
+                <a14:hiddenFill xmlns="" xmlns:a14="http://schemas.microsoft.com/office/drawing/2010/main">
                   <a:solidFill>
                     <a:srgbClr val="FFFFFF"/>
                   </a:solidFill>
                 </a14:hiddenFill>
               </a:ext>
               <a:ext uri="{91240B29-F687-4f45-9708-019B960494DF}">
-                <a14:hiddenLine xmlns:a14="http://schemas.microsoft.com/office/drawing/2010/main" xmlns="" w="9525">
+                <a14:hiddenLine xmlns="" xmlns:a14="http://schemas.microsoft.com/office/drawing/2010/main" w="9525">
                   <a:solidFill>
                     <a:srgbClr val="000000"/>
                   </a:solidFill>
@@ -18182,14 +18327,14 @@
             </a:ln>
             <a:extLst>
               <a:ext uri="{909E8E84-426E-40dd-AFC4-6F175D3DCCD1}">
-                <a14:hiddenFill xmlns:a14="http://schemas.microsoft.com/office/drawing/2010/main" xmlns="">
+                <a14:hiddenFill xmlns="" xmlns:a14="http://schemas.microsoft.com/office/drawing/2010/main">
                   <a:solidFill>
                     <a:srgbClr val="FFFFFF"/>
                   </a:solidFill>
                 </a14:hiddenFill>
               </a:ext>
               <a:ext uri="{91240B29-F687-4f45-9708-019B960494DF}">
-                <a14:hiddenLine xmlns:a14="http://schemas.microsoft.com/office/drawing/2010/main" xmlns="" w="9525">
+                <a14:hiddenLine xmlns="" xmlns:a14="http://schemas.microsoft.com/office/drawing/2010/main" w="9525">
                   <a:solidFill>
                     <a:srgbClr val="000000"/>
                   </a:solidFill>
@@ -18402,14 +18547,14 @@
             </a:ln>
             <a:extLst>
               <a:ext uri="{909E8E84-426E-40dd-AFC4-6F175D3DCCD1}">
-                <a14:hiddenFill xmlns:a14="http://schemas.microsoft.com/office/drawing/2010/main" xmlns="">
+                <a14:hiddenFill xmlns="" xmlns:a14="http://schemas.microsoft.com/office/drawing/2010/main">
                   <a:solidFill>
                     <a:srgbClr val="FFFFFF"/>
                   </a:solidFill>
                 </a14:hiddenFill>
               </a:ext>
               <a:ext uri="{91240B29-F687-4f45-9708-019B960494DF}">
-                <a14:hiddenLine xmlns:a14="http://schemas.microsoft.com/office/drawing/2010/main" xmlns="" w="9525">
+                <a14:hiddenLine xmlns="" xmlns:a14="http://schemas.microsoft.com/office/drawing/2010/main" w="9525">
                   <a:solidFill>
                     <a:srgbClr val="000000"/>
                   </a:solidFill>
@@ -18576,7 +18721,7 @@
           </a:ln>
           <a:extLst>
             <a:ext uri="{909E8E84-426E-40dd-AFC4-6F175D3DCCD1}">
-              <a14:hiddenFill xmlns:a14="http://schemas.microsoft.com/office/drawing/2010/main" xmlns="">
+              <a14:hiddenFill xmlns="" xmlns:a14="http://schemas.microsoft.com/office/drawing/2010/main">
                 <a:noFill/>
               </a14:hiddenFill>
             </a:ext>
@@ -18630,14 +18775,14 @@
             </a:ln>
             <a:extLst>
               <a:ext uri="{909E8E84-426E-40dd-AFC4-6F175D3DCCD1}">
-                <a14:hiddenFill xmlns:a14="http://schemas.microsoft.com/office/drawing/2010/main" xmlns="">
+                <a14:hiddenFill xmlns="" xmlns:a14="http://schemas.microsoft.com/office/drawing/2010/main">
                   <a:solidFill>
                     <a:srgbClr val="FFFFFF"/>
                   </a:solidFill>
                 </a14:hiddenFill>
               </a:ext>
               <a:ext uri="{91240B29-F687-4f45-9708-019B960494DF}">
-                <a14:hiddenLine xmlns:a14="http://schemas.microsoft.com/office/drawing/2010/main" xmlns="" w="9525">
+                <a14:hiddenLine xmlns="" xmlns:a14="http://schemas.microsoft.com/office/drawing/2010/main" w="9525">
                   <a:solidFill>
                     <a:srgbClr val="000000"/>
                   </a:solidFill>
@@ -18822,14 +18967,14 @@
             </a:ln>
             <a:extLst>
               <a:ext uri="{909E8E84-426E-40dd-AFC4-6F175D3DCCD1}">
-                <a14:hiddenFill xmlns:a14="http://schemas.microsoft.com/office/drawing/2010/main" xmlns="">
+                <a14:hiddenFill xmlns="" xmlns:a14="http://schemas.microsoft.com/office/drawing/2010/main">
                   <a:solidFill>
                     <a:srgbClr val="FFFFFF"/>
                   </a:solidFill>
                 </a14:hiddenFill>
               </a:ext>
               <a:ext uri="{91240B29-F687-4f45-9708-019B960494DF}">
-                <a14:hiddenLine xmlns:a14="http://schemas.microsoft.com/office/drawing/2010/main" xmlns="" w="9525">
+                <a14:hiddenLine xmlns="" xmlns:a14="http://schemas.microsoft.com/office/drawing/2010/main" w="9525">
                   <a:solidFill>
                     <a:srgbClr val="000000"/>
                   </a:solidFill>
@@ -19033,7 +19178,7 @@
           </a:ln>
           <a:extLst>
             <a:ext uri="{909E8E84-426E-40dd-AFC4-6F175D3DCCD1}">
-              <a14:hiddenFill xmlns:a14="http://schemas.microsoft.com/office/drawing/2010/main" xmlns="">
+              <a14:hiddenFill xmlns="" xmlns:a14="http://schemas.microsoft.com/office/drawing/2010/main">
                 <a:solidFill>
                   <a:srgbClr val="FFFFFF"/>
                 </a:solidFill>
@@ -19119,7 +19264,7 @@
           </a:ln>
           <a:extLst>
             <a:ext uri="{909E8E84-426E-40dd-AFC4-6F175D3DCCD1}">
-              <a14:hiddenFill xmlns:a14="http://schemas.microsoft.com/office/drawing/2010/main" xmlns="">
+              <a14:hiddenFill xmlns="" xmlns:a14="http://schemas.microsoft.com/office/drawing/2010/main">
                 <a:solidFill>
                   <a:srgbClr val="FFFFFF"/>
                 </a:solidFill>
@@ -19159,14 +19304,14 @@
           </a:ln>
           <a:extLst>
             <a:ext uri="{909E8E84-426E-40dd-AFC4-6F175D3DCCD1}">
-              <a14:hiddenFill xmlns:a14="http://schemas.microsoft.com/office/drawing/2010/main" xmlns="">
+              <a14:hiddenFill xmlns="" xmlns:a14="http://schemas.microsoft.com/office/drawing/2010/main">
                 <a:solidFill>
                   <a:srgbClr val="FFFFFF"/>
                 </a:solidFill>
               </a14:hiddenFill>
             </a:ext>
             <a:ext uri="{91240B29-F687-4f45-9708-019B960494DF}">
-              <a14:hiddenLine xmlns:a14="http://schemas.microsoft.com/office/drawing/2010/main" xmlns="" w="9525">
+              <a14:hiddenLine xmlns="" xmlns:a14="http://schemas.microsoft.com/office/drawing/2010/main" w="9525">
                 <a:solidFill>
                   <a:srgbClr val="000000"/>
                 </a:solidFill>
@@ -19336,7 +19481,7 @@
           </a:ln>
           <a:extLst>
             <a:ext uri="{909E8E84-426E-40dd-AFC4-6F175D3DCCD1}">
-              <a14:hiddenFill xmlns:a14="http://schemas.microsoft.com/office/drawing/2010/main" xmlns="">
+              <a14:hiddenFill xmlns="" xmlns:a14="http://schemas.microsoft.com/office/drawing/2010/main">
                 <a:noFill/>
               </a14:hiddenFill>
             </a:ext>
@@ -19390,14 +19535,14 @@
             </a:ln>
             <a:extLst>
               <a:ext uri="{909E8E84-426E-40dd-AFC4-6F175D3DCCD1}">
-                <a14:hiddenFill xmlns:a14="http://schemas.microsoft.com/office/drawing/2010/main" xmlns="">
+                <a14:hiddenFill xmlns="" xmlns:a14="http://schemas.microsoft.com/office/drawing/2010/main">
                   <a:solidFill>
                     <a:srgbClr val="FFFFFF"/>
                   </a:solidFill>
                 </a14:hiddenFill>
               </a:ext>
               <a:ext uri="{91240B29-F687-4f45-9708-019B960494DF}">
-                <a14:hiddenLine xmlns:a14="http://schemas.microsoft.com/office/drawing/2010/main" xmlns="" w="9525">
+                <a14:hiddenLine xmlns="" xmlns:a14="http://schemas.microsoft.com/office/drawing/2010/main" w="9525">
                   <a:solidFill>
                     <a:srgbClr val="000000"/>
                   </a:solidFill>
@@ -19565,14 +19710,14 @@
             </a:ln>
             <a:extLst>
               <a:ext uri="{909E8E84-426E-40dd-AFC4-6F175D3DCCD1}">
-                <a14:hiddenFill xmlns:a14="http://schemas.microsoft.com/office/drawing/2010/main" xmlns="">
+                <a14:hiddenFill xmlns="" xmlns:a14="http://schemas.microsoft.com/office/drawing/2010/main">
                   <a:solidFill>
                     <a:srgbClr val="FFFFFF"/>
                   </a:solidFill>
                 </a14:hiddenFill>
               </a:ext>
               <a:ext uri="{91240B29-F687-4f45-9708-019B960494DF}">
-                <a14:hiddenLine xmlns:a14="http://schemas.microsoft.com/office/drawing/2010/main" xmlns="" w="9525">
+                <a14:hiddenLine xmlns="" xmlns:a14="http://schemas.microsoft.com/office/drawing/2010/main" w="9525">
                   <a:solidFill>
                     <a:srgbClr val="000000"/>
                   </a:solidFill>
@@ -19736,7 +19881,7 @@
           </a:ln>
           <a:extLst>
             <a:ext uri="{909E8E84-426E-40dd-AFC4-6F175D3DCCD1}">
-              <a14:hiddenFill xmlns:a14="http://schemas.microsoft.com/office/drawing/2010/main" xmlns="">
+              <a14:hiddenFill xmlns="" xmlns:a14="http://schemas.microsoft.com/office/drawing/2010/main">
                 <a:noFill/>
               </a14:hiddenFill>
             </a:ext>
@@ -19787,14 +19932,14 @@
           </a:ln>
           <a:extLst>
             <a:ext uri="{909E8E84-426E-40dd-AFC4-6F175D3DCCD1}">
-              <a14:hiddenFill xmlns:a14="http://schemas.microsoft.com/office/drawing/2010/main" xmlns="">
+              <a14:hiddenFill xmlns="" xmlns:a14="http://schemas.microsoft.com/office/drawing/2010/main">
                 <a:solidFill>
                   <a:srgbClr val="FFFFFF"/>
                 </a:solidFill>
               </a14:hiddenFill>
             </a:ext>
             <a:ext uri="{91240B29-F687-4f45-9708-019B960494DF}">
-              <a14:hiddenLine xmlns:a14="http://schemas.microsoft.com/office/drawing/2010/main" xmlns="" w="9525">
+              <a14:hiddenLine xmlns="" xmlns:a14="http://schemas.microsoft.com/office/drawing/2010/main" w="9525">
                 <a:solidFill>
                   <a:srgbClr val="000000"/>
                 </a:solidFill>
@@ -19833,7 +19978,7 @@
           </a:ln>
           <a:extLst>
             <a:ext uri="{909E8E84-426E-40dd-AFC4-6F175D3DCCD1}">
-              <a14:hiddenFill xmlns:a14="http://schemas.microsoft.com/office/drawing/2010/main" xmlns="">
+              <a14:hiddenFill xmlns="" xmlns:a14="http://schemas.microsoft.com/office/drawing/2010/main">
                 <a:noFill/>
               </a14:hiddenFill>
             </a:ext>
@@ -19871,14 +20016,14 @@
           </a:ln>
           <a:extLst>
             <a:ext uri="{909E8E84-426E-40dd-AFC4-6F175D3DCCD1}">
-              <a14:hiddenFill xmlns:a14="http://schemas.microsoft.com/office/drawing/2010/main" xmlns="">
+              <a14:hiddenFill xmlns="" xmlns:a14="http://schemas.microsoft.com/office/drawing/2010/main">
                 <a:solidFill>
                   <a:srgbClr val="FFFFFF"/>
                 </a:solidFill>
               </a14:hiddenFill>
             </a:ext>
             <a:ext uri="{91240B29-F687-4f45-9708-019B960494DF}">
-              <a14:hiddenLine xmlns:a14="http://schemas.microsoft.com/office/drawing/2010/main" xmlns="" w="9525">
+              <a14:hiddenLine xmlns="" xmlns:a14="http://schemas.microsoft.com/office/drawing/2010/main" w="9525">
                 <a:solidFill>
                   <a:srgbClr val="000000"/>
                 </a:solidFill>
@@ -20035,14 +20180,14 @@
           </a:ln>
           <a:extLst>
             <a:ext uri="{909E8E84-426E-40dd-AFC4-6F175D3DCCD1}">
-              <a14:hiddenFill xmlns:a14="http://schemas.microsoft.com/office/drawing/2010/main" xmlns="">
+              <a14:hiddenFill xmlns="" xmlns:a14="http://schemas.microsoft.com/office/drawing/2010/main">
                 <a:solidFill>
                   <a:srgbClr val="FFFFFF"/>
                 </a:solidFill>
               </a14:hiddenFill>
             </a:ext>
             <a:ext uri="{91240B29-F687-4f45-9708-019B960494DF}">
-              <a14:hiddenLine xmlns:a14="http://schemas.microsoft.com/office/drawing/2010/main" xmlns="" w="9525">
+              <a14:hiddenLine xmlns="" xmlns:a14="http://schemas.microsoft.com/office/drawing/2010/main" w="9525">
                 <a:solidFill>
                   <a:srgbClr val="000000"/>
                 </a:solidFill>
@@ -20219,14 +20364,14 @@
           </a:ln>
           <a:extLst>
             <a:ext uri="{909E8E84-426E-40dd-AFC4-6F175D3DCCD1}">
-              <a14:hiddenFill xmlns:a14="http://schemas.microsoft.com/office/drawing/2010/main" xmlns="">
+              <a14:hiddenFill xmlns="" xmlns:a14="http://schemas.microsoft.com/office/drawing/2010/main">
                 <a:solidFill>
                   <a:srgbClr val="FFFFFF"/>
                 </a:solidFill>
               </a14:hiddenFill>
             </a:ext>
             <a:ext uri="{91240B29-F687-4f45-9708-019B960494DF}">
-              <a14:hiddenLine xmlns:a14="http://schemas.microsoft.com/office/drawing/2010/main" xmlns="" w="9525">
+              <a14:hiddenLine xmlns="" xmlns:a14="http://schemas.microsoft.com/office/drawing/2010/main" w="9525">
                 <a:solidFill>
                   <a:srgbClr val="000000"/>
                 </a:solidFill>
@@ -20416,7 +20561,7 @@
             </a:ln>
             <a:extLst>
               <a:ext uri="{909E8E84-426E-40dd-AFC4-6F175D3DCCD1}">
-                <a14:hiddenFill xmlns="" xmlns:a14="http://schemas.microsoft.com/office/drawing/2010/main">
+                <a14:hiddenFill xmlns:a14="http://schemas.microsoft.com/office/drawing/2010/main" xmlns="">
                   <a:solidFill>
                     <a:srgbClr val="FFFFFF"/>
                   </a:solidFill>
@@ -20457,14 +20602,14 @@
             </a:ln>
             <a:extLst>
               <a:ext uri="{909E8E84-426E-40dd-AFC4-6F175D3DCCD1}">
-                <a14:hiddenFill xmlns="" xmlns:a14="http://schemas.microsoft.com/office/drawing/2010/main">
+                <a14:hiddenFill xmlns:a14="http://schemas.microsoft.com/office/drawing/2010/main" xmlns="">
                   <a:solidFill>
                     <a:srgbClr val="FFFFFF"/>
                   </a:solidFill>
                 </a14:hiddenFill>
               </a:ext>
               <a:ext uri="{91240B29-F687-4f45-9708-019B960494DF}">
-                <a14:hiddenLine xmlns="" xmlns:a14="http://schemas.microsoft.com/office/drawing/2010/main" w="9525">
+                <a14:hiddenLine xmlns:a14="http://schemas.microsoft.com/office/drawing/2010/main" xmlns="" w="9525">
                   <a:solidFill>
                     <a:srgbClr val="000000"/>
                   </a:solidFill>
@@ -20625,7 +20770,7 @@
             </a:ln>
             <a:extLst>
               <a:ext uri="{909E8E84-426E-40dd-AFC4-6F175D3DCCD1}">
-                <a14:hiddenFill xmlns="" xmlns:a14="http://schemas.microsoft.com/office/drawing/2010/main">
+                <a14:hiddenFill xmlns:a14="http://schemas.microsoft.com/office/drawing/2010/main" xmlns="">
                   <a:solidFill>
                     <a:srgbClr val="FFFFFF"/>
                   </a:solidFill>
@@ -20666,14 +20811,14 @@
             </a:ln>
             <a:extLst>
               <a:ext uri="{909E8E84-426E-40dd-AFC4-6F175D3DCCD1}">
-                <a14:hiddenFill xmlns="" xmlns:a14="http://schemas.microsoft.com/office/drawing/2010/main">
+                <a14:hiddenFill xmlns:a14="http://schemas.microsoft.com/office/drawing/2010/main" xmlns="">
                   <a:solidFill>
                     <a:srgbClr val="FFFFFF"/>
                   </a:solidFill>
                 </a14:hiddenFill>
               </a:ext>
               <a:ext uri="{91240B29-F687-4f45-9708-019B960494DF}">
-                <a14:hiddenLine xmlns="" xmlns:a14="http://schemas.microsoft.com/office/drawing/2010/main" w="9525">
+                <a14:hiddenLine xmlns:a14="http://schemas.microsoft.com/office/drawing/2010/main" xmlns="" w="9525">
                   <a:solidFill>
                     <a:srgbClr val="000000"/>
                   </a:solidFill>
@@ -20834,7 +20979,7 @@
             </a:ln>
             <a:extLst>
               <a:ext uri="{909E8E84-426E-40dd-AFC4-6F175D3DCCD1}">
-                <a14:hiddenFill xmlns="" xmlns:a14="http://schemas.microsoft.com/office/drawing/2010/main">
+                <a14:hiddenFill xmlns:a14="http://schemas.microsoft.com/office/drawing/2010/main" xmlns="">
                   <a:solidFill>
                     <a:srgbClr val="FFFFFF"/>
                   </a:solidFill>
@@ -20875,14 +21020,14 @@
             </a:ln>
             <a:extLst>
               <a:ext uri="{909E8E84-426E-40dd-AFC4-6F175D3DCCD1}">
-                <a14:hiddenFill xmlns="" xmlns:a14="http://schemas.microsoft.com/office/drawing/2010/main">
+                <a14:hiddenFill xmlns:a14="http://schemas.microsoft.com/office/drawing/2010/main" xmlns="">
                   <a:solidFill>
                     <a:srgbClr val="FFFFFF"/>
                   </a:solidFill>
                 </a14:hiddenFill>
               </a:ext>
               <a:ext uri="{91240B29-F687-4f45-9708-019B960494DF}">
-                <a14:hiddenLine xmlns="" xmlns:a14="http://schemas.microsoft.com/office/drawing/2010/main" w="9525">
+                <a14:hiddenLine xmlns:a14="http://schemas.microsoft.com/office/drawing/2010/main" xmlns="" w="9525">
                   <a:solidFill>
                     <a:srgbClr val="000000"/>
                   </a:solidFill>
@@ -21038,14 +21183,14 @@
             </a:ln>
             <a:extLst>
               <a:ext uri="{909E8E84-426E-40dd-AFC4-6F175D3DCCD1}">
-                <a14:hiddenFill xmlns="" xmlns:a14="http://schemas.microsoft.com/office/drawing/2010/main">
+                <a14:hiddenFill xmlns:a14="http://schemas.microsoft.com/office/drawing/2010/main" xmlns="">
                   <a:solidFill>
                     <a:srgbClr val="FFFFFF"/>
                   </a:solidFill>
                 </a14:hiddenFill>
               </a:ext>
               <a:ext uri="{91240B29-F687-4f45-9708-019B960494DF}">
-                <a14:hiddenLine xmlns="" xmlns:a14="http://schemas.microsoft.com/office/drawing/2010/main" w="9525">
+                <a14:hiddenLine xmlns:a14="http://schemas.microsoft.com/office/drawing/2010/main" xmlns="" w="9525">
                   <a:solidFill>
                     <a:srgbClr val="000000"/>
                   </a:solidFill>
@@ -21226,7 +21371,7 @@
             </a:ln>
             <a:extLst>
               <a:ext uri="{909E8E84-426E-40dd-AFC4-6F175D3DCCD1}">
-                <a14:hiddenFill xmlns="" xmlns:a14="http://schemas.microsoft.com/office/drawing/2010/main">
+                <a14:hiddenFill xmlns:a14="http://schemas.microsoft.com/office/drawing/2010/main" xmlns="">
                   <a:solidFill>
                     <a:srgbClr val="FFFFFF"/>
                   </a:solidFill>
@@ -21267,14 +21412,14 @@
             </a:ln>
             <a:extLst>
               <a:ext uri="{909E8E84-426E-40dd-AFC4-6F175D3DCCD1}">
-                <a14:hiddenFill xmlns="" xmlns:a14="http://schemas.microsoft.com/office/drawing/2010/main">
+                <a14:hiddenFill xmlns:a14="http://schemas.microsoft.com/office/drawing/2010/main" xmlns="">
                   <a:solidFill>
                     <a:srgbClr val="FFFFFF"/>
                   </a:solidFill>
                 </a14:hiddenFill>
               </a:ext>
               <a:ext uri="{91240B29-F687-4f45-9708-019B960494DF}">
-                <a14:hiddenLine xmlns="" xmlns:a14="http://schemas.microsoft.com/office/drawing/2010/main" w="9525">
+                <a14:hiddenLine xmlns:a14="http://schemas.microsoft.com/office/drawing/2010/main" xmlns="" w="9525">
                   <a:solidFill>
                     <a:srgbClr val="000000"/>
                   </a:solidFill>
@@ -21474,7 +21619,7 @@
             </a:ln>
             <a:extLst>
               <a:ext uri="{909E8E84-426E-40dd-AFC4-6F175D3DCCD1}">
-                <a14:hiddenFill xmlns="" xmlns:a14="http://schemas.microsoft.com/office/drawing/2010/main">
+                <a14:hiddenFill xmlns:a14="http://schemas.microsoft.com/office/drawing/2010/main" xmlns="">
                   <a:solidFill>
                     <a:srgbClr val="FFFFFF"/>
                   </a:solidFill>
@@ -21520,7 +21665,7 @@
             </a:ln>
             <a:extLst>
               <a:ext uri="{909E8E84-426E-40dd-AFC4-6F175D3DCCD1}">
-                <a14:hiddenFill xmlns="" xmlns:a14="http://schemas.microsoft.com/office/drawing/2010/main">
+                <a14:hiddenFill xmlns:a14="http://schemas.microsoft.com/office/drawing/2010/main" xmlns="">
                   <a:solidFill>
                     <a:srgbClr val="FFFFFF"/>
                   </a:solidFill>
@@ -21561,14 +21706,14 @@
             </a:ln>
             <a:extLst>
               <a:ext uri="{909E8E84-426E-40dd-AFC4-6F175D3DCCD1}">
-                <a14:hiddenFill xmlns="" xmlns:a14="http://schemas.microsoft.com/office/drawing/2010/main">
+                <a14:hiddenFill xmlns:a14="http://schemas.microsoft.com/office/drawing/2010/main" xmlns="">
                   <a:solidFill>
                     <a:srgbClr val="FFFFFF"/>
                   </a:solidFill>
                 </a14:hiddenFill>
               </a:ext>
               <a:ext uri="{91240B29-F687-4f45-9708-019B960494DF}">
-                <a14:hiddenLine xmlns="" xmlns:a14="http://schemas.microsoft.com/office/drawing/2010/main" w="9525">
+                <a14:hiddenLine xmlns:a14="http://schemas.microsoft.com/office/drawing/2010/main" xmlns="" w="9525">
                   <a:solidFill>
                     <a:srgbClr val="000000"/>
                   </a:solidFill>
@@ -21724,14 +21869,14 @@
             </a:ln>
             <a:extLst>
               <a:ext uri="{909E8E84-426E-40dd-AFC4-6F175D3DCCD1}">
-                <a14:hiddenFill xmlns="" xmlns:a14="http://schemas.microsoft.com/office/drawing/2010/main">
+                <a14:hiddenFill xmlns:a14="http://schemas.microsoft.com/office/drawing/2010/main" xmlns="">
                   <a:solidFill>
                     <a:srgbClr val="FFFFFF"/>
                   </a:solidFill>
                 </a14:hiddenFill>
               </a:ext>
               <a:ext uri="{91240B29-F687-4f45-9708-019B960494DF}">
-                <a14:hiddenLine xmlns="" xmlns:a14="http://schemas.microsoft.com/office/drawing/2010/main" w="9525">
+                <a14:hiddenLine xmlns:a14="http://schemas.microsoft.com/office/drawing/2010/main" xmlns="" w="9525">
                   <a:solidFill>
                     <a:srgbClr val="000000"/>
                   </a:solidFill>
@@ -21887,14 +22032,14 @@
             </a:ln>
             <a:extLst>
               <a:ext uri="{909E8E84-426E-40dd-AFC4-6F175D3DCCD1}">
-                <a14:hiddenFill xmlns="" xmlns:a14="http://schemas.microsoft.com/office/drawing/2010/main">
+                <a14:hiddenFill xmlns:a14="http://schemas.microsoft.com/office/drawing/2010/main" xmlns="">
                   <a:solidFill>
                     <a:srgbClr val="FFFFFF"/>
                   </a:solidFill>
                 </a14:hiddenFill>
               </a:ext>
               <a:ext uri="{91240B29-F687-4f45-9708-019B960494DF}">
-                <a14:hiddenLine xmlns="" xmlns:a14="http://schemas.microsoft.com/office/drawing/2010/main" w="9525">
+                <a14:hiddenLine xmlns:a14="http://schemas.microsoft.com/office/drawing/2010/main" xmlns="" w="9525">
                   <a:solidFill>
                     <a:srgbClr val="000000"/>
                   </a:solidFill>
@@ -22050,14 +22195,14 @@
             </a:ln>
             <a:extLst>
               <a:ext uri="{909E8E84-426E-40dd-AFC4-6F175D3DCCD1}">
-                <a14:hiddenFill xmlns="" xmlns:a14="http://schemas.microsoft.com/office/drawing/2010/main">
+                <a14:hiddenFill xmlns:a14="http://schemas.microsoft.com/office/drawing/2010/main" xmlns="">
                   <a:solidFill>
                     <a:srgbClr val="FFFFFF"/>
                   </a:solidFill>
                 </a14:hiddenFill>
               </a:ext>
               <a:ext uri="{91240B29-F687-4f45-9708-019B960494DF}">
-                <a14:hiddenLine xmlns="" xmlns:a14="http://schemas.microsoft.com/office/drawing/2010/main" w="9525">
+                <a14:hiddenLine xmlns:a14="http://schemas.microsoft.com/office/drawing/2010/main" xmlns="" w="9525">
                   <a:solidFill>
                     <a:srgbClr val="000000"/>
                   </a:solidFill>
@@ -22217,14 +22362,14 @@
           </a:ln>
           <a:extLst>
             <a:ext uri="{909E8E84-426E-40dd-AFC4-6F175D3DCCD1}">
-              <a14:hiddenFill xmlns="" xmlns:a14="http://schemas.microsoft.com/office/drawing/2010/main">
+              <a14:hiddenFill xmlns:a14="http://schemas.microsoft.com/office/drawing/2010/main" xmlns="">
                 <a:solidFill>
                   <a:srgbClr val="FFFFFF"/>
                 </a:solidFill>
               </a14:hiddenFill>
             </a:ext>
             <a:ext uri="{91240B29-F687-4f45-9708-019B960494DF}">
-              <a14:hiddenLine xmlns="" xmlns:a14="http://schemas.microsoft.com/office/drawing/2010/main" w="9525">
+              <a14:hiddenLine xmlns:a14="http://schemas.microsoft.com/office/drawing/2010/main" xmlns="" w="9525">
                 <a:solidFill>
                   <a:srgbClr val="000000"/>
                 </a:solidFill>
@@ -22417,14 +22562,14 @@
           <a:ln/>
           <a:extLst>
             <a:ext uri="{909E8E84-426E-40dd-AFC4-6F175D3DCCD1}">
-              <a14:hiddenFill xmlns="" xmlns:a14="http://schemas.microsoft.com/office/drawing/2010/main">
+              <a14:hiddenFill xmlns:a14="http://schemas.microsoft.com/office/drawing/2010/main" xmlns="">
                 <a:solidFill>
                   <a:srgbClr val="FFFFFF"/>
                 </a:solidFill>
               </a14:hiddenFill>
             </a:ext>
             <a:ext uri="{91240B29-F687-4f45-9708-019B960494DF}">
-              <a14:hiddenLine xmlns="" xmlns:a14="http://schemas.microsoft.com/office/drawing/2010/main" w="9525">
+              <a14:hiddenLine xmlns:a14="http://schemas.microsoft.com/office/drawing/2010/main" xmlns="" w="9525">
                 <a:solidFill>
                   <a:srgbClr val="000000"/>
                 </a:solidFill>

</xml_diff>